<commit_message>
Revert "Hopefully a fix."
This reverts commit 6a37ed541bbeea8dda6d86c0a4d6dc3e91eab39b.
</commit_message>
<xml_diff>
--- a/Assignment/Marketing Presentation/Marketing Presentation Final.pptx
+++ b/Assignment/Marketing Presentation/Marketing Presentation Final.pptx
@@ -15,11 +15,10 @@
     <p:sldId id="263" r:id="rId9"/>
     <p:sldId id="264" r:id="rId10"/>
     <p:sldId id="266" r:id="rId11"/>
-    <p:sldId id="270" r:id="rId12"/>
-    <p:sldId id="267" r:id="rId13"/>
-    <p:sldId id="268" r:id="rId14"/>
-    <p:sldId id="269" r:id="rId15"/>
-    <p:sldId id="265" r:id="rId16"/>
+    <p:sldId id="267" r:id="rId12"/>
+    <p:sldId id="268" r:id="rId13"/>
+    <p:sldId id="269" r:id="rId14"/>
+    <p:sldId id="265" r:id="rId15"/>
   </p:sldIdLst>
   <p:sldSz cx="9144000" cy="6858000" type="screen4x3"/>
   <p:notesSz cx="6858000" cy="9144000"/>
@@ -2923,7 +2922,7 @@
             <a:fld id="{8FC7EFCB-1FF8-4D79-9E09-C3D919A3AD35}" type="datetimeFigureOut">
               <a:rPr lang="en-CA" smtClean="0"/>
               <a:pPr/>
-              <a:t>09/04/2014</a:t>
+              <a:t>07/04/2014</a:t>
             </a:fld>
             <a:endParaRPr lang="en-CA"/>
           </a:p>
@@ -3438,7 +3437,7 @@
             <a:fld id="{8FC7EFCB-1FF8-4D79-9E09-C3D919A3AD35}" type="datetimeFigureOut">
               <a:rPr lang="en-CA" smtClean="0"/>
               <a:pPr/>
-              <a:t>09/04/2014</a:t>
+              <a:t>07/04/2014</a:t>
             </a:fld>
             <a:endParaRPr lang="en-CA"/>
           </a:p>
@@ -3615,7 +3614,7 @@
             <a:fld id="{8FC7EFCB-1FF8-4D79-9E09-C3D919A3AD35}" type="datetimeFigureOut">
               <a:rPr lang="en-CA" smtClean="0"/>
               <a:pPr/>
-              <a:t>09/04/2014</a:t>
+              <a:t>07/04/2014</a:t>
             </a:fld>
             <a:endParaRPr lang="en-CA"/>
           </a:p>
@@ -3782,7 +3781,7 @@
             <a:fld id="{8FC7EFCB-1FF8-4D79-9E09-C3D919A3AD35}" type="datetimeFigureOut">
               <a:rPr lang="en-CA" smtClean="0"/>
               <a:pPr/>
-              <a:t>09/04/2014</a:t>
+              <a:t>07/04/2014</a:t>
             </a:fld>
             <a:endParaRPr lang="en-CA"/>
           </a:p>
@@ -6908,7 +6907,7 @@
             <a:fld id="{8FC7EFCB-1FF8-4D79-9E09-C3D919A3AD35}" type="datetimeFigureOut">
               <a:rPr lang="en-CA" smtClean="0"/>
               <a:pPr/>
-              <a:t>09/04/2014</a:t>
+              <a:t>07/04/2014</a:t>
             </a:fld>
             <a:endParaRPr lang="en-CA"/>
           </a:p>
@@ -7193,7 +7192,7 @@
             <a:fld id="{8FC7EFCB-1FF8-4D79-9E09-C3D919A3AD35}" type="datetimeFigureOut">
               <a:rPr lang="en-CA" smtClean="0"/>
               <a:pPr/>
-              <a:t>09/04/2014</a:t>
+              <a:t>07/04/2014</a:t>
             </a:fld>
             <a:endParaRPr lang="en-CA"/>
           </a:p>
@@ -7612,7 +7611,7 @@
             <a:fld id="{8FC7EFCB-1FF8-4D79-9E09-C3D919A3AD35}" type="datetimeFigureOut">
               <a:rPr lang="en-CA" smtClean="0"/>
               <a:pPr/>
-              <a:t>09/04/2014</a:t>
+              <a:t>07/04/2014</a:t>
             </a:fld>
             <a:endParaRPr lang="en-CA"/>
           </a:p>
@@ -7727,7 +7726,7 @@
             <a:fld id="{8FC7EFCB-1FF8-4D79-9E09-C3D919A3AD35}" type="datetimeFigureOut">
               <a:rPr lang="en-CA" smtClean="0"/>
               <a:pPr/>
-              <a:t>09/04/2014</a:t>
+              <a:t>07/04/2014</a:t>
             </a:fld>
             <a:endParaRPr lang="en-CA"/>
           </a:p>
@@ -7819,7 +7818,7 @@
             <a:fld id="{8FC7EFCB-1FF8-4D79-9E09-C3D919A3AD35}" type="datetimeFigureOut">
               <a:rPr lang="en-CA" smtClean="0"/>
               <a:pPr/>
-              <a:t>09/04/2014</a:t>
+              <a:t>07/04/2014</a:t>
             </a:fld>
             <a:endParaRPr lang="en-CA"/>
           </a:p>
@@ -7996,7 +7995,7 @@
             <a:fld id="{8FC7EFCB-1FF8-4D79-9E09-C3D919A3AD35}" type="datetimeFigureOut">
               <a:rPr lang="en-CA" smtClean="0"/>
               <a:pPr/>
-              <a:t>09/04/2014</a:t>
+              <a:t>07/04/2014</a:t>
             </a:fld>
             <a:endParaRPr lang="en-CA"/>
           </a:p>
@@ -8484,7 +8483,7 @@
             <a:fld id="{8FC7EFCB-1FF8-4D79-9E09-C3D919A3AD35}" type="datetimeFigureOut">
               <a:rPr lang="en-CA" smtClean="0"/>
               <a:pPr/>
-              <a:t>09/04/2014</a:t>
+              <a:t>07/04/2014</a:t>
             </a:fld>
             <a:endParaRPr lang="en-CA"/>
           </a:p>
@@ -9038,7 +9037,7 @@
             <a:fld id="{8FC7EFCB-1FF8-4D79-9E09-C3D919A3AD35}" type="datetimeFigureOut">
               <a:rPr lang="en-CA" smtClean="0"/>
               <a:pPr/>
-              <a:t>09/04/2014</a:t>
+              <a:t>07/04/2014</a:t>
             </a:fld>
             <a:endParaRPr lang="en-CA"/>
           </a:p>
@@ -9492,7 +9491,11 @@
           <a:p>
             <a:r>
               <a:rPr lang="en-CA" dirty="0" smtClean="0"/>
-              <a:t>A Pixel Brothers Marketing Presentation</a:t>
+              <a:t>A Pixel Brothers Marketing </a:t>
+            </a:r>
+            <a:r>
+              <a:rPr lang="en-CA" dirty="0" smtClean="0"/>
+              <a:t>Presentation</a:t>
             </a:r>
             <a:endParaRPr lang="en-CA" dirty="0"/>
           </a:p>
@@ -9501,7 +9504,7 @@
     </p:spTree>
     <p:extLst>
       <p:ext uri="{BB962C8B-B14F-4D97-AF65-F5344CB8AC3E}">
-        <p14:creationId xmlns="" xmlns:p14="http://schemas.microsoft.com/office/powerpoint/2010/main" val="1936824716"/>
+        <p14:creationId xmlns:p14="http://schemas.microsoft.com/office/powerpoint/2010/main" val="1936824716"/>
       </p:ext>
     </p:extLst>
   </p:cSld>
@@ -9570,26 +9573,106 @@
           <a:p>
             <a:r>
               <a:rPr lang="en-US" dirty="0" smtClean="0"/>
-              <a:t>The PC houses the largest amount of gamers than any other platforms</a:t>
-            </a:r>
-          </a:p>
-          <a:p>
+              <a:t>The </a:t>
+            </a:r>
             <a:r>
               <a:rPr lang="en-US" dirty="0" smtClean="0"/>
-              <a:t>PC’s allow for more accessibility for players than consoles do. This includes control customization, system requirements and mobility</a:t>
-            </a:r>
-          </a:p>
-          <a:p>
+              <a:t>PC </a:t>
+            </a:r>
             <a:r>
               <a:rPr lang="en-US" dirty="0" smtClean="0"/>
-              <a:t>PC’s also allow us to update our game more efficiently than on consoles</a:t>
-            </a:r>
-          </a:p>
-          <a:p>
+              <a:t>houses the largest amount of gamers than any other </a:t>
+            </a:r>
             <a:r>
               <a:rPr lang="en-US" dirty="0" smtClean="0"/>
-              <a:t>Games can be played without requiring online services and DRM that consoles would usually have</a:t>
-            </a:r>
+              <a:t>platforms</a:t>
+            </a:r>
+            <a:endParaRPr lang="en-US" dirty="0" smtClean="0"/>
+          </a:p>
+          <a:p>
+            <a:r>
+              <a:rPr lang="en-US" dirty="0" smtClean="0"/>
+              <a:t>PC’s allow </a:t>
+            </a:r>
+            <a:r>
+              <a:rPr lang="en-US" dirty="0" smtClean="0"/>
+              <a:t>for</a:t>
+            </a:r>
+            <a:r>
+              <a:rPr lang="en-US" dirty="0" smtClean="0"/>
+              <a:t> </a:t>
+            </a:r>
+            <a:r>
+              <a:rPr lang="en-US" dirty="0" smtClean="0"/>
+              <a:t>more accessibility for players than consoles </a:t>
+            </a:r>
+            <a:r>
+              <a:rPr lang="en-US" dirty="0" smtClean="0"/>
+              <a:t>do. </a:t>
+            </a:r>
+            <a:r>
+              <a:rPr lang="en-US" dirty="0" smtClean="0"/>
+              <a:t>This includes control customization, system requirements and </a:t>
+            </a:r>
+            <a:r>
+              <a:rPr lang="en-US" dirty="0" smtClean="0"/>
+              <a:t>mobility</a:t>
+            </a:r>
+            <a:endParaRPr lang="en-US" dirty="0" smtClean="0"/>
+          </a:p>
+          <a:p>
+            <a:r>
+              <a:rPr lang="en-US" dirty="0" smtClean="0"/>
+              <a:t>PC’s </a:t>
+            </a:r>
+            <a:r>
+              <a:rPr lang="en-US" dirty="0" smtClean="0"/>
+              <a:t>also </a:t>
+            </a:r>
+            <a:r>
+              <a:rPr lang="en-US" dirty="0" smtClean="0"/>
+              <a:t>allow </a:t>
+            </a:r>
+            <a:r>
+              <a:rPr lang="en-US" dirty="0" smtClean="0"/>
+              <a:t>us to update our game more efficiently than on </a:t>
+            </a:r>
+            <a:r>
+              <a:rPr lang="en-US" dirty="0" smtClean="0"/>
+              <a:t>consoles</a:t>
+            </a:r>
+            <a:endParaRPr lang="en-US" dirty="0" smtClean="0"/>
+          </a:p>
+          <a:p>
+            <a:r>
+              <a:rPr lang="en-US" dirty="0" smtClean="0"/>
+              <a:t>Games </a:t>
+            </a:r>
+            <a:r>
+              <a:rPr lang="en-US" dirty="0" smtClean="0"/>
+              <a:t>can be played without requiring </a:t>
+            </a:r>
+            <a:r>
+              <a:rPr lang="en-US" dirty="0" smtClean="0"/>
+              <a:t>online services </a:t>
+            </a:r>
+            <a:r>
+              <a:rPr lang="en-US" dirty="0" smtClean="0"/>
+              <a:t>and DRM that </a:t>
+            </a:r>
+            <a:r>
+              <a:rPr lang="en-US" dirty="0" smtClean="0"/>
+              <a:t>consoles </a:t>
+            </a:r>
+            <a:r>
+              <a:rPr lang="en-US" dirty="0" smtClean="0"/>
+              <a:t>would usually </a:t>
+            </a:r>
+            <a:r>
+              <a:rPr lang="en-US" dirty="0" smtClean="0"/>
+              <a:t>have</a:t>
+            </a:r>
+            <a:endParaRPr lang="en-US" dirty="0" smtClean="0"/>
           </a:p>
         </p:txBody>
       </p:sp>
@@ -9634,10 +9717,10 @@
           <a:lstStyle/>
           <a:p>
             <a:r>
-              <a:rPr lang="en-US" smtClean="0"/>
-              <a:t>Why on Mobile?</a:t>
-            </a:r>
-            <a:endParaRPr lang="en-US"/>
+              <a:rPr lang="en-US" dirty="0" smtClean="0"/>
+              <a:t>Hazards of PC</a:t>
+            </a:r>
+            <a:endParaRPr lang="en-US" dirty="0"/>
           </a:p>
         </p:txBody>
       </p:sp>
@@ -9653,10 +9736,50 @@
         </p:nvSpPr>
         <p:spPr/>
         <p:txBody>
-          <a:bodyPr/>
+          <a:bodyPr>
+            <a:normAutofit/>
+          </a:bodyPr>
           <a:lstStyle/>
           <a:p>
-            <a:endParaRPr lang="en-US"/>
+            <a:r>
+              <a:rPr lang="en-US" dirty="0" smtClean="0"/>
+              <a:t>Piracy is the biggest issue when releasing games on PC as it can harm the sales of </a:t>
+            </a:r>
+            <a:r>
+              <a:rPr lang="en-US" dirty="0" err="1" smtClean="0"/>
+              <a:t>Misthaven</a:t>
+            </a:r>
+            <a:endParaRPr lang="en-US" dirty="0" smtClean="0"/>
+          </a:p>
+          <a:p>
+            <a:r>
+              <a:rPr lang="en-US" dirty="0" smtClean="0"/>
+              <a:t>Like other PC games, Misthaven is </a:t>
+            </a:r>
+            <a:r>
+              <a:rPr lang="en-US" dirty="0" smtClean="0"/>
+              <a:t>digitally </a:t>
+            </a:r>
+            <a:r>
+              <a:rPr lang="en-US" dirty="0" smtClean="0"/>
+              <a:t>released only and will require online access to purchase the </a:t>
+            </a:r>
+            <a:r>
+              <a:rPr lang="en-US" dirty="0" smtClean="0"/>
+              <a:t>game</a:t>
+            </a:r>
+            <a:endParaRPr lang="en-US" dirty="0" smtClean="0"/>
+          </a:p>
+          <a:p>
+            <a:r>
+              <a:rPr lang="en-US" dirty="0" smtClean="0"/>
+              <a:t>Sites such as GOG.com do not offer auto updates and will require players to reinstall the game for every </a:t>
+            </a:r>
+            <a:r>
+              <a:rPr lang="en-US" dirty="0" smtClean="0"/>
+              <a:t>update</a:t>
+            </a:r>
+            <a:endParaRPr lang="en-US" dirty="0" smtClean="0"/>
           </a:p>
         </p:txBody>
       </p:sp>
@@ -9697,12 +9820,14 @@
         </p:nvSpPr>
         <p:spPr/>
         <p:txBody>
-          <a:bodyPr/>
+          <a:bodyPr>
+            <a:normAutofit fontScale="90000"/>
+          </a:bodyPr>
           <a:lstStyle/>
           <a:p>
             <a:r>
               <a:rPr lang="en-US" dirty="0" smtClean="0"/>
-              <a:t>Hazards of PC</a:t>
+              <a:t>Our Analysis on Marketing: Competitions</a:t>
             </a:r>
             <a:endParaRPr lang="en-US" dirty="0"/>
           </a:p>
@@ -9720,31 +9845,18 @@
         </p:nvSpPr>
         <p:spPr/>
         <p:txBody>
-          <a:bodyPr>
-            <a:normAutofit/>
-          </a:bodyPr>
+          <a:bodyPr/>
           <a:lstStyle/>
           <a:p>
             <a:r>
               <a:rPr lang="en-US" dirty="0" smtClean="0"/>
-              <a:t>Piracy is the biggest issue when releasing games on PC as it can harm the sales of </a:t>
-            </a:r>
-            <a:r>
-              <a:rPr lang="en-US" dirty="0" err="1" smtClean="0"/>
-              <a:t>Misthaven</a:t>
-            </a:r>
-            <a:endParaRPr lang="en-US" dirty="0" smtClean="0"/>
+              <a:t>The expected competitors of Misthaven are other types of indie games, some of which share similar aspects as Misthaven does</a:t>
+            </a:r>
           </a:p>
           <a:p>
             <a:r>
               <a:rPr lang="en-US" dirty="0" smtClean="0"/>
-              <a:t>Like other PC games, Misthaven is digitally released only and will require online access to purchase the game</a:t>
-            </a:r>
-          </a:p>
-          <a:p>
-            <a:r>
-              <a:rPr lang="en-US" dirty="0" smtClean="0"/>
-              <a:t>Sites such as GOG.com do not offer auto updates and will require players to reinstall the game for every update</a:t>
+              <a:t>When asked about stacking up Misthaven to other competition, Misthaven will offer both a visual and a story telling advantage over the other independent games that are available.</a:t>
             </a:r>
           </a:p>
         </p:txBody>
@@ -9787,13 +9899,13 @@
         <p:spPr/>
         <p:txBody>
           <a:bodyPr>
-            <a:normAutofit fontScale="90000"/>
+            <a:normAutofit/>
           </a:bodyPr>
           <a:lstStyle/>
           <a:p>
             <a:r>
               <a:rPr lang="en-US" dirty="0" smtClean="0"/>
-              <a:t>Our Analysis on Marketing: Competitions</a:t>
+              <a:t>Our Analysis on Marketing: Advantages</a:t>
             </a:r>
             <a:endParaRPr lang="en-US" dirty="0"/>
           </a:p>
@@ -9811,19 +9923,67 @@
         </p:nvSpPr>
         <p:spPr/>
         <p:txBody>
-          <a:bodyPr/>
+          <a:bodyPr>
+            <a:normAutofit/>
+          </a:bodyPr>
           <a:lstStyle/>
           <a:p>
             <a:r>
               <a:rPr lang="en-US" dirty="0" smtClean="0"/>
-              <a:t>The expected competitors of Misthaven are other types of indie games, some of which share similar aspects as Misthaven does</a:t>
-            </a:r>
-          </a:p>
-          <a:p>
+              <a:t>One of the </a:t>
+            </a:r>
             <a:r>
               <a:rPr lang="en-US" dirty="0" smtClean="0"/>
-              <a:t>When asked about stacking up Misthaven to other competition, Misthaven will offer both a visual and a story telling advantage over the other independent games that are available.</a:t>
-            </a:r>
+              <a:t>advantages </a:t>
+            </a:r>
+            <a:r>
+              <a:rPr lang="en-US" dirty="0" smtClean="0"/>
+              <a:t>that Misthaven will have over the competitors is the game, </a:t>
+            </a:r>
+            <a:r>
+              <a:rPr lang="en-US" dirty="0" smtClean="0"/>
+              <a:t>while being inspired </a:t>
+            </a:r>
+            <a:r>
+              <a:rPr lang="en-US" dirty="0" smtClean="0"/>
+              <a:t>by older Nintendo games, captures the feel of those games and can show a large amount of appeal towards </a:t>
+            </a:r>
+            <a:r>
+              <a:rPr lang="en-US" dirty="0" smtClean="0"/>
+              <a:t>the target audience</a:t>
+            </a:r>
+            <a:endParaRPr lang="en-US" dirty="0" smtClean="0"/>
+          </a:p>
+          <a:p>
+            <a:r>
+              <a:rPr lang="en-US" dirty="0" smtClean="0"/>
+              <a:t>Another </a:t>
+            </a:r>
+            <a:r>
+              <a:rPr lang="en-US" dirty="0" smtClean="0"/>
+              <a:t>advantage is </a:t>
+            </a:r>
+            <a:r>
+              <a:rPr lang="en-US" dirty="0" smtClean="0"/>
+              <a:t>that Misthaven has </a:t>
+            </a:r>
+            <a:r>
+              <a:rPr lang="en-US" dirty="0" smtClean="0"/>
+              <a:t>a lot of </a:t>
+            </a:r>
+            <a:r>
+              <a:rPr lang="en-US" dirty="0" smtClean="0"/>
+              <a:t>story telling as </a:t>
+            </a:r>
+            <a:r>
+              <a:rPr lang="en-US" dirty="0" smtClean="0"/>
+              <a:t>it is </a:t>
+            </a:r>
+            <a:r>
+              <a:rPr lang="en-US" dirty="0" smtClean="0"/>
+              <a:t>is heavily focused on the game’s story and lore</a:t>
+            </a:r>
+            <a:endParaRPr lang="en-US" dirty="0"/>
           </a:p>
         </p:txBody>
       </p:sp>
@@ -9864,87 +10024,6 @@
         </p:nvSpPr>
         <p:spPr/>
         <p:txBody>
-          <a:bodyPr>
-            <a:normAutofit/>
-          </a:bodyPr>
-          <a:lstStyle/>
-          <a:p>
-            <a:r>
-              <a:rPr lang="en-US" dirty="0" smtClean="0"/>
-              <a:t>Our Analysis on Marketing: Advantages</a:t>
-            </a:r>
-            <a:endParaRPr lang="en-US" dirty="0"/>
-          </a:p>
-        </p:txBody>
-      </p:sp>
-      <p:sp>
-        <p:nvSpPr>
-          <p:cNvPr id="3" name="Content Placeholder 2"/>
-          <p:cNvSpPr>
-            <a:spLocks noGrp="1"/>
-          </p:cNvSpPr>
-          <p:nvPr>
-            <p:ph idx="1"/>
-          </p:nvPr>
-        </p:nvSpPr>
-        <p:spPr/>
-        <p:txBody>
-          <a:bodyPr>
-            <a:normAutofit/>
-          </a:bodyPr>
-          <a:lstStyle/>
-          <a:p>
-            <a:r>
-              <a:rPr lang="en-US" dirty="0" smtClean="0"/>
-              <a:t>One of the advantages that Misthaven will have over the competitors is the game, while being inspired by older Nintendo games, captures the feel of those games and can show a large amount of appeal towards the target audience</a:t>
-            </a:r>
-          </a:p>
-          <a:p>
-            <a:r>
-              <a:rPr lang="en-US" dirty="0" smtClean="0"/>
-              <a:t>Another advantage is that Misthaven has a lot of story telling as it is is heavily focused on the game’s story and lore</a:t>
-            </a:r>
-            <a:endParaRPr lang="en-US" dirty="0"/>
-          </a:p>
-        </p:txBody>
-      </p:sp>
-    </p:spTree>
-  </p:cSld>
-  <p:clrMapOvr>
-    <a:masterClrMapping/>
-  </p:clrMapOvr>
-</p:sld>
-</file>
-
-<file path=ppt/slides/slide15.xml><?xml version="1.0" encoding="utf-8"?>
-<p:sld xmlns:a="http://schemas.openxmlformats.org/drawingml/2006/main" xmlns:r="http://schemas.openxmlformats.org/officeDocument/2006/relationships" xmlns:p="http://schemas.openxmlformats.org/presentationml/2006/main">
-  <p:cSld>
-    <p:spTree>
-      <p:nvGrpSpPr>
-        <p:cNvPr id="1" name=""/>
-        <p:cNvGrpSpPr/>
-        <p:nvPr/>
-      </p:nvGrpSpPr>
-      <p:grpSpPr>
-        <a:xfrm>
-          <a:off x="0" y="0"/>
-          <a:ext cx="0" cy="0"/>
-          <a:chOff x="0" y="0"/>
-          <a:chExt cx="0" cy="0"/>
-        </a:xfrm>
-      </p:grpSpPr>
-      <p:sp>
-        <p:nvSpPr>
-          <p:cNvPr id="2" name="Title 1"/>
-          <p:cNvSpPr>
-            <a:spLocks noGrp="1"/>
-          </p:cNvSpPr>
-          <p:nvPr>
-            <p:ph type="title"/>
-          </p:nvPr>
-        </p:nvSpPr>
-        <p:spPr/>
-        <p:txBody>
           <a:bodyPr/>
           <a:lstStyle/>
           <a:p>
@@ -9973,14 +10052,31 @@
           <a:p>
             <a:r>
               <a:rPr lang="en-US" dirty="0" smtClean="0"/>
-              <a:t>The Pixel brothers is associated with adventure type games because the developers enjoy adventure games themselves</a:t>
-            </a:r>
-          </a:p>
-          <a:p>
+              <a:t>The </a:t>
+            </a:r>
             <a:r>
               <a:rPr lang="en-US" dirty="0" smtClean="0"/>
-              <a:t>The Brand message of The Pixel brothers is to make throwbacks to older games, while still keeping the modern appeal</a:t>
-            </a:r>
+              <a:t>Pixel brothers is associated with adventure type games because the developers enjoy adventure games themselves</a:t>
+            </a:r>
+          </a:p>
+          <a:p>
+            <a:r>
+              <a:rPr lang="en-US" dirty="0" smtClean="0"/>
+              <a:t>The Brand message </a:t>
+            </a:r>
+            <a:r>
+              <a:rPr lang="en-US" dirty="0" smtClean="0"/>
+              <a:t>of The </a:t>
+            </a:r>
+            <a:r>
+              <a:rPr lang="en-US" dirty="0" smtClean="0"/>
+              <a:t>Pixel brothers is to make throwbacks to older </a:t>
+            </a:r>
+            <a:r>
+              <a:rPr lang="en-US" dirty="0" smtClean="0"/>
+              <a:t>games, while still keeping the modern appeal</a:t>
+            </a:r>
+            <a:endParaRPr lang="en-US" dirty="0" smtClean="0"/>
           </a:p>
         </p:txBody>
       </p:sp>
@@ -10051,7 +10147,11 @@
           <a:p>
             <a:r>
               <a:rPr lang="en-CA" dirty="0" smtClean="0"/>
-              <a:t>The Pixel </a:t>
+              <a:t>The </a:t>
+            </a:r>
+            <a:r>
+              <a:rPr lang="en-CA" dirty="0" smtClean="0"/>
+              <a:t>Pixel </a:t>
             </a:r>
             <a:r>
               <a:rPr lang="en-CA" dirty="0"/>
@@ -10059,7 +10159,27 @@
             </a:r>
             <a:r>
               <a:rPr lang="en-CA" dirty="0" smtClean="0"/>
-              <a:t>rothers are a 6 man team of game developers, working on their game “Once upon a time in Misthaven” or “Misthaven” for short</a:t>
+              <a:t>rothers </a:t>
+            </a:r>
+            <a:r>
+              <a:rPr lang="en-CA" dirty="0" smtClean="0"/>
+              <a:t>are</a:t>
+            </a:r>
+            <a:r>
+              <a:rPr lang="en-CA" dirty="0" smtClean="0"/>
+              <a:t> </a:t>
+            </a:r>
+            <a:r>
+              <a:rPr lang="en-CA" dirty="0" smtClean="0"/>
+              <a:t>a 6 man team of game developers, working on </a:t>
+            </a:r>
+            <a:r>
+              <a:rPr lang="en-CA" dirty="0" smtClean="0"/>
+              <a:t>their </a:t>
+            </a:r>
+            <a:r>
+              <a:rPr lang="en-CA" dirty="0" smtClean="0"/>
+              <a:t>game “Once upon a time in Misthaven” or “Misthaven” for short</a:t>
             </a:r>
           </a:p>
           <a:p>
@@ -10147,7 +10267,7 @@
     </p:spTree>
     <p:extLst>
       <p:ext uri="{BB962C8B-B14F-4D97-AF65-F5344CB8AC3E}">
-        <p14:creationId xmlns="" xmlns:p14="http://schemas.microsoft.com/office/powerpoint/2010/main" val="2600421956"/>
+        <p14:creationId xmlns:p14="http://schemas.microsoft.com/office/powerpoint/2010/main" val="2600421956"/>
       </p:ext>
     </p:extLst>
   </p:cSld>
@@ -10222,13 +10342,50 @@
           <a:p>
             <a:r>
               <a:rPr lang="en-CA" dirty="0" smtClean="0"/>
-              <a:t>Set in the world of Misthaven after a planetary cataclysm, you play as a hero trying to save his people from being sacrificed to the dragon that has destroyed the world.</a:t>
-            </a:r>
-          </a:p>
-          <a:p>
+              <a:t>Set in the world of Misthaven after a planetary cataclysm, you play as a hero </a:t>
+            </a:r>
             <a:r>
               <a:rPr lang="en-CA" dirty="0" smtClean="0"/>
-              <a:t>Features a story that will have players emotionally attached to the characters and events.</a:t>
+              <a:t>trying </a:t>
+            </a:r>
+            <a:r>
+              <a:rPr lang="en-CA" dirty="0" smtClean="0"/>
+              <a:t>to </a:t>
+            </a:r>
+            <a:r>
+              <a:rPr lang="en-CA" dirty="0" smtClean="0"/>
+              <a:t>save his </a:t>
+            </a:r>
+            <a:r>
+              <a:rPr lang="en-CA" dirty="0" smtClean="0"/>
+              <a:t>people from being sacrificed to the dragon that </a:t>
+            </a:r>
+            <a:r>
+              <a:rPr lang="en-CA" dirty="0" smtClean="0"/>
+              <a:t>has </a:t>
+            </a:r>
+            <a:r>
+              <a:rPr lang="en-CA" dirty="0" smtClean="0"/>
+              <a:t>destroyed the </a:t>
+            </a:r>
+            <a:r>
+              <a:rPr lang="en-CA" dirty="0" smtClean="0"/>
+              <a:t>world.</a:t>
+            </a:r>
+            <a:endParaRPr lang="en-CA" dirty="0" smtClean="0"/>
+          </a:p>
+          <a:p>
+            <a:r>
+              <a:rPr lang="en-CA" dirty="0" smtClean="0"/>
+              <a:t>Features a story that will have players emotionally attached to </a:t>
+            </a:r>
+            <a:r>
+              <a:rPr lang="en-CA" dirty="0" smtClean="0"/>
+              <a:t>the characters </a:t>
+            </a:r>
+            <a:r>
+              <a:rPr lang="en-CA" dirty="0" smtClean="0"/>
+              <a:t>and events.</a:t>
             </a:r>
             <a:endParaRPr lang="en-CA" dirty="0"/>
           </a:p>
@@ -10237,7 +10394,7 @@
     </p:spTree>
     <p:extLst>
       <p:ext uri="{BB962C8B-B14F-4D97-AF65-F5344CB8AC3E}">
-        <p14:creationId xmlns="" xmlns:p14="http://schemas.microsoft.com/office/powerpoint/2010/main" val="1727645945"/>
+        <p14:creationId xmlns:p14="http://schemas.microsoft.com/office/powerpoint/2010/main" val="1727645945"/>
       </p:ext>
     </p:extLst>
   </p:cSld>
@@ -10289,7 +10446,15 @@
             </a:r>
             <a:r>
               <a:rPr lang="en-CA" dirty="0" smtClean="0"/>
-              <a:t>would want this game?</a:t>
+              <a:t>would</a:t>
+            </a:r>
+            <a:r>
+              <a:rPr lang="en-CA" dirty="0" smtClean="0"/>
+              <a:t> </a:t>
+            </a:r>
+            <a:r>
+              <a:rPr lang="en-CA" dirty="0" smtClean="0"/>
+              <a:t>want this game?</a:t>
             </a:r>
             <a:endParaRPr lang="en-CA" dirty="0"/>
           </a:p>
@@ -10335,8 +10500,13 @@
           <a:p>
             <a:r>
               <a:rPr lang="en-CA" dirty="0" smtClean="0"/>
-              <a:t>Hack and slash elements</a:t>
-            </a:r>
+              <a:t>Hack and slash </a:t>
+            </a:r>
+            <a:r>
+              <a:rPr lang="en-CA" dirty="0" smtClean="0"/>
+              <a:t>elements</a:t>
+            </a:r>
+            <a:endParaRPr lang="en-CA" dirty="0" smtClean="0"/>
           </a:p>
           <a:p>
             <a:r>
@@ -10370,7 +10540,7 @@
     </p:spTree>
     <p:extLst>
       <p:ext uri="{BB962C8B-B14F-4D97-AF65-F5344CB8AC3E}">
-        <p14:creationId xmlns="" xmlns:p14="http://schemas.microsoft.com/office/powerpoint/2010/main" val="3629457851"/>
+        <p14:creationId xmlns:p14="http://schemas.microsoft.com/office/powerpoint/2010/main" val="3629457851"/>
       </p:ext>
     </p:extLst>
   </p:cSld>
@@ -10433,7 +10603,7 @@
         <p:spPr/>
         <p:txBody>
           <a:bodyPr>
-            <a:normAutofit lnSpcReduction="10000"/>
+            <a:normAutofit/>
           </a:bodyPr>
           <a:lstStyle/>
           <a:p>
@@ -10473,16 +10643,35 @@
           <a:p>
             <a:r>
               <a:rPr lang="en-CA" dirty="0" smtClean="0"/>
-              <a:t>Indie bundle stores such as the Humble Bundle, Indie gala and bundle star. These will be considered in the future once the game have been released. </a:t>
-            </a:r>
-          </a:p>
-          <a:p>
-            <a:pPr>
-              <a:buNone/>
-            </a:pPr>
+              <a:t>Indie bundle stores such </a:t>
+            </a:r>
             <a:r>
               <a:rPr lang="en-CA" dirty="0" smtClean="0"/>
-              <a:t>The game will also be available for mobile devices such as android, I-phones and Windows Phone if the game has proven to have sold well.</a:t>
+              <a:t>as the </a:t>
+            </a:r>
+            <a:r>
+              <a:rPr lang="en-CA" dirty="0" smtClean="0"/>
+              <a:t>Humble Bundle, Indie gala and bundle </a:t>
+            </a:r>
+            <a:r>
+              <a:rPr lang="en-CA" dirty="0" smtClean="0"/>
+              <a:t>star. These </a:t>
+            </a:r>
+            <a:r>
+              <a:rPr lang="en-CA" dirty="0" smtClean="0"/>
+              <a:t>will be considered in the future </a:t>
+            </a:r>
+            <a:r>
+              <a:rPr lang="en-CA" dirty="0" smtClean="0"/>
+              <a:t>on</a:t>
+            </a:r>
+            <a:r>
+              <a:rPr lang="en-CA" dirty="0" smtClean="0"/>
+              <a:t>ce </a:t>
+            </a:r>
+            <a:r>
+              <a:rPr lang="en-CA" dirty="0" smtClean="0"/>
+              <a:t>the game have been released. </a:t>
             </a:r>
           </a:p>
         </p:txBody>
@@ -10490,7 +10679,7 @@
     </p:spTree>
     <p:extLst>
       <p:ext uri="{BB962C8B-B14F-4D97-AF65-F5344CB8AC3E}">
-        <p14:creationId xmlns="" xmlns:p14="http://schemas.microsoft.com/office/powerpoint/2010/main" val="261435882"/>
+        <p14:creationId xmlns:p14="http://schemas.microsoft.com/office/powerpoint/2010/main" val="261435882"/>
       </p:ext>
     </p:extLst>
   </p:cSld>
@@ -10559,7 +10748,31 @@
           <a:p>
             <a:r>
               <a:rPr lang="en-CA" dirty="0" smtClean="0"/>
-              <a:t>One of the ways we can create awareness of our game is to have it advertised in major PC gaming websites such as </a:t>
+              <a:t>One of the ways </a:t>
+            </a:r>
+            <a:r>
+              <a:rPr lang="en-CA" dirty="0" smtClean="0"/>
+              <a:t>we can</a:t>
+            </a:r>
+            <a:r>
+              <a:rPr lang="en-CA" dirty="0" smtClean="0"/>
+              <a:t> </a:t>
+            </a:r>
+            <a:r>
+              <a:rPr lang="en-CA" dirty="0" smtClean="0"/>
+              <a:t>create awareness of </a:t>
+            </a:r>
+            <a:r>
+              <a:rPr lang="en-CA" dirty="0" smtClean="0"/>
+              <a:t>our</a:t>
+            </a:r>
+            <a:r>
+              <a:rPr lang="en-CA" dirty="0" smtClean="0"/>
+              <a:t> </a:t>
+            </a:r>
+            <a:r>
+              <a:rPr lang="en-CA" dirty="0" smtClean="0"/>
+              <a:t>game is to have it advertised in major PC gaming websites such as </a:t>
             </a:r>
             <a:r>
               <a:rPr lang="en-CA" dirty="0" err="1" smtClean="0"/>
@@ -10594,27 +10807,6 @@
             <a:r>
               <a:rPr lang="en-CA" dirty="0" err="1" smtClean="0"/>
               <a:t>FarFromSubtle</a:t>
-            </a:r>
-            <a:endParaRPr lang="en-CA" dirty="0" smtClean="0"/>
-          </a:p>
-          <a:p>
-            <a:r>
-              <a:rPr lang="en-CA" dirty="0" smtClean="0"/>
-              <a:t>As for Mobile devices, it is estimated that both the Android and </a:t>
-            </a:r>
-            <a:r>
-              <a:rPr lang="en-CA" dirty="0" err="1" smtClean="0"/>
-              <a:t>iPhone</a:t>
-            </a:r>
-            <a:r>
-              <a:rPr lang="en-CA" dirty="0" smtClean="0"/>
-              <a:t> altogether takes up of 92% of the Smartphone marketing as well as 91% of the tablet device market.</a:t>
-            </a:r>
-          </a:p>
-          <a:p>
-            <a:r>
-              <a:rPr lang="en-CA" dirty="0" smtClean="0"/>
-              <a:t>(Face book alone has almost 50% of the world’s population in terms of active users)</a:t>
             </a:r>
             <a:endParaRPr lang="en-CA" dirty="0"/>
           </a:p>
@@ -10623,7 +10815,7 @@
     </p:spTree>
     <p:extLst>
       <p:ext uri="{BB962C8B-B14F-4D97-AF65-F5344CB8AC3E}">
-        <p14:creationId xmlns="" xmlns:p14="http://schemas.microsoft.com/office/powerpoint/2010/main" val="3105899645"/>
+        <p14:creationId xmlns:p14="http://schemas.microsoft.com/office/powerpoint/2010/main" val="3105899645"/>
       </p:ext>
     </p:extLst>
   </p:cSld>
@@ -10690,19 +10882,52 @@
           <a:p>
             <a:r>
               <a:rPr lang="en-CA" dirty="0" smtClean="0"/>
-              <a:t>The team can help each other out by splitting up the work load for multiple people</a:t>
-            </a:r>
-          </a:p>
-          <a:p>
+              <a:t>The team can </a:t>
+            </a:r>
             <a:r>
               <a:rPr lang="en-CA" dirty="0" smtClean="0"/>
-              <a:t>Each member of the team is specifically tasked to work on a certain part of the project</a:t>
-            </a:r>
-          </a:p>
-          <a:p>
+              <a:t>help </a:t>
+            </a:r>
             <a:r>
               <a:rPr lang="en-CA" dirty="0" smtClean="0"/>
-              <a:t>Since our team is small and independent, we can work without any form of pressure from publishers.</a:t>
+              <a:t>each </a:t>
+            </a:r>
+            <a:r>
+              <a:rPr lang="en-CA" dirty="0" smtClean="0"/>
+              <a:t>other out </a:t>
+            </a:r>
+            <a:r>
+              <a:rPr lang="en-CA" dirty="0" smtClean="0"/>
+              <a:t>by splitting up the work load for </a:t>
+            </a:r>
+            <a:r>
+              <a:rPr lang="en-CA" dirty="0" smtClean="0"/>
+              <a:t>multiple </a:t>
+            </a:r>
+            <a:r>
+              <a:rPr lang="en-CA" dirty="0" smtClean="0"/>
+              <a:t>people</a:t>
+            </a:r>
+          </a:p>
+          <a:p>
+            <a:r>
+              <a:rPr lang="en-CA" dirty="0" smtClean="0"/>
+              <a:t>Each member of the team is specifically tasked to work on a certain part of the </a:t>
+            </a:r>
+            <a:r>
+              <a:rPr lang="en-CA" dirty="0" smtClean="0"/>
+              <a:t>project</a:t>
+            </a:r>
+            <a:endParaRPr lang="en-CA" dirty="0" smtClean="0"/>
+          </a:p>
+          <a:p>
+            <a:r>
+              <a:rPr lang="en-CA" dirty="0" smtClean="0"/>
+              <a:t>Since </a:t>
+            </a:r>
+            <a:r>
+              <a:rPr lang="en-CA" dirty="0" smtClean="0"/>
+              <a:t>our team is small and independent, we can work without any form of pressure from publishers.</a:t>
             </a:r>
           </a:p>
         </p:txBody>
@@ -10710,7 +10935,7 @@
     </p:spTree>
     <p:extLst>
       <p:ext uri="{BB962C8B-B14F-4D97-AF65-F5344CB8AC3E}">
-        <p14:creationId xmlns="" xmlns:p14="http://schemas.microsoft.com/office/powerpoint/2010/main" val="3401474335"/>
+        <p14:creationId xmlns:p14="http://schemas.microsoft.com/office/powerpoint/2010/main" val="3401474335"/>
       </p:ext>
     </p:extLst>
   </p:cSld>
@@ -10754,7 +10979,11 @@
           <a:p>
             <a:r>
               <a:rPr lang="en-CA" dirty="0" smtClean="0"/>
-              <a:t>The Team’s Weaknesses</a:t>
+              <a:t>The Team’s </a:t>
+            </a:r>
+            <a:r>
+              <a:rPr lang="en-CA" dirty="0" smtClean="0"/>
+              <a:t>Weaknesses</a:t>
             </a:r>
             <a:endParaRPr lang="en-CA" dirty="0"/>
           </a:p>
@@ -10785,13 +11014,50 @@
           <a:p>
             <a:r>
               <a:rPr lang="en-CA" dirty="0" smtClean="0"/>
-              <a:t>Despite having to work together, each person has their own strengths and weaknesses, which can affect the progression of the development in both good and bad ways</a:t>
-            </a:r>
-          </a:p>
-          <a:p>
+              <a:t>Despite having to work together, </a:t>
+            </a:r>
             <a:r>
               <a:rPr lang="en-CA" dirty="0" smtClean="0"/>
-              <a:t>The game is an independent title so it is unlikely for the game to easily gain popularity due to competition in the market</a:t>
+              <a:t>each person has </a:t>
+            </a:r>
+            <a:r>
+              <a:rPr lang="en-CA" dirty="0" smtClean="0"/>
+              <a:t>their own </a:t>
+            </a:r>
+            <a:r>
+              <a:rPr lang="en-CA" dirty="0" smtClean="0"/>
+              <a:t>strengths </a:t>
+            </a:r>
+            <a:r>
+              <a:rPr lang="en-CA" dirty="0" smtClean="0"/>
+              <a:t>and </a:t>
+            </a:r>
+            <a:r>
+              <a:rPr lang="en-CA" dirty="0" smtClean="0"/>
+              <a:t>weaknesses, </a:t>
+            </a:r>
+            <a:r>
+              <a:rPr lang="en-CA" dirty="0" smtClean="0"/>
+              <a:t>which can affect the progression of the </a:t>
+            </a:r>
+            <a:r>
+              <a:rPr lang="en-CA" dirty="0" smtClean="0"/>
+              <a:t>development in both good and bad ways</a:t>
+            </a:r>
+            <a:endParaRPr lang="en-CA" dirty="0" smtClean="0"/>
+          </a:p>
+          <a:p>
+            <a:r>
+              <a:rPr lang="en-CA" dirty="0" smtClean="0"/>
+              <a:t>The game is an independent title so it is unlikely for the game </a:t>
+            </a:r>
+            <a:r>
+              <a:rPr lang="en-CA" dirty="0" smtClean="0"/>
+              <a:t>to easily </a:t>
+            </a:r>
+            <a:r>
+              <a:rPr lang="en-CA" dirty="0" smtClean="0"/>
+              <a:t>gain popularity due to competition in the market</a:t>
             </a:r>
           </a:p>
           <a:p>
@@ -10799,13 +11065,14 @@
               <a:rPr lang="en-CA" dirty="0" smtClean="0"/>
               <a:t>Piracy can affect the sales of the project</a:t>
             </a:r>
+            <a:endParaRPr lang="en-CA" dirty="0" smtClean="0"/>
           </a:p>
         </p:txBody>
       </p:sp>
     </p:spTree>
     <p:extLst>
       <p:ext uri="{BB962C8B-B14F-4D97-AF65-F5344CB8AC3E}">
-        <p14:creationId xmlns="" xmlns:p14="http://schemas.microsoft.com/office/powerpoint/2010/main" val="3849336531"/>
+        <p14:creationId xmlns:p14="http://schemas.microsoft.com/office/powerpoint/2010/main" val="3849336531"/>
       </p:ext>
     </p:extLst>
   </p:cSld>
@@ -10893,7 +11160,7 @@
     </p:spTree>
     <p:extLst>
       <p:ext uri="{BB962C8B-B14F-4D97-AF65-F5344CB8AC3E}">
-        <p14:creationId xmlns="" xmlns:p14="http://schemas.microsoft.com/office/powerpoint/2010/main" val="996127871"/>
+        <p14:creationId xmlns:p14="http://schemas.microsoft.com/office/powerpoint/2010/main" val="996127871"/>
       </p:ext>
     </p:extLst>
   </p:cSld>

</xml_diff>